<commit_message>
some more work into the report
</commit_message>
<xml_diff>
--- a/knowledgerep/Presentation1.pptx
+++ b/knowledgerep/Presentation1.pptx
@@ -7,6 +7,7 @@
   <p:sldIdLst>
     <p:sldId id="256" r:id="rId2"/>
     <p:sldId id="257" r:id="rId3"/>
+    <p:sldId id="258" r:id="rId4"/>
   </p:sldIdLst>
   <p:sldSz cx="12192000" cy="6858000"/>
   <p:notesSz cx="6858000" cy="9144000"/>
@@ -105,6 +106,11 @@
       </a:defRPr>
     </a:lvl9pPr>
   </p:defaultTextStyle>
+  <p:extLst>
+    <p:ext uri="{EFAFB233-063F-42B5-8137-9DF3F51BA10A}">
+      <p15:sldGuideLst xmlns:p15="http://schemas.microsoft.com/office/powerpoint/2012/main"/>
+    </p:ext>
+  </p:extLst>
 </p:presentation>
 </file>
 
@@ -5585,6 +5591,546 @@
 </p:sld>
 </file>
 
+<file path=ppt/slides/slide3.xml><?xml version="1.0" encoding="utf-8"?>
+<p:sld xmlns:a="http://schemas.openxmlformats.org/drawingml/2006/main" xmlns:r="http://schemas.openxmlformats.org/officeDocument/2006/relationships" xmlns:p="http://schemas.openxmlformats.org/presentationml/2006/main">
+  <p:cSld>
+    <p:spTree>
+      <p:nvGrpSpPr>
+        <p:cNvPr id="1" name=""/>
+        <p:cNvGrpSpPr/>
+        <p:nvPr/>
+      </p:nvGrpSpPr>
+      <p:grpSpPr>
+        <a:xfrm>
+          <a:off x="0" y="0"/>
+          <a:ext cx="0" cy="0"/>
+          <a:chOff x="0" y="0"/>
+          <a:chExt cx="0" cy="0"/>
+        </a:xfrm>
+      </p:grpSpPr>
+      <p:sp>
+        <p:nvSpPr>
+          <p:cNvPr id="4" name="Oval 3">
+            <a:extLst>
+              <a:ext uri="{FF2B5EF4-FFF2-40B4-BE49-F238E27FC236}">
+                <a16:creationId xmlns:a16="http://schemas.microsoft.com/office/drawing/2014/main" id="{410868FE-6C59-4CD1-A255-0E081468E9D0}"/>
+              </a:ext>
+            </a:extLst>
+          </p:cNvPr>
+          <p:cNvSpPr/>
+          <p:nvPr/>
+        </p:nvSpPr>
+        <p:spPr>
+          <a:xfrm>
+            <a:off x="1324233" y="884945"/>
+            <a:ext cx="1837038" cy="873211"/>
+          </a:xfrm>
+          <a:prstGeom prst="ellipse">
+            <a:avLst/>
+          </a:prstGeom>
+        </p:spPr>
+        <p:style>
+          <a:lnRef idx="2">
+            <a:schemeClr val="accent1">
+              <a:shade val="50000"/>
+            </a:schemeClr>
+          </a:lnRef>
+          <a:fillRef idx="1">
+            <a:schemeClr val="accent1"/>
+          </a:fillRef>
+          <a:effectRef idx="0">
+            <a:schemeClr val="accent1"/>
+          </a:effectRef>
+          <a:fontRef idx="minor">
+            <a:schemeClr val="lt1"/>
+          </a:fontRef>
+        </p:style>
+        <p:txBody>
+          <a:bodyPr rtlCol="0" anchor="ctr"/>
+          <a:lstStyle/>
+          <a:p>
+            <a:pPr algn="ctr"/>
+            <a:r>
+              <a:rPr lang="en-US" sz="1600" dirty="0" err="1"/>
+              <a:t>LateWakeUp</a:t>
+            </a:r>
+            <a:endParaRPr lang="en-US" sz="1600" dirty="0"/>
+          </a:p>
+        </p:txBody>
+      </p:sp>
+      <p:sp>
+        <p:nvSpPr>
+          <p:cNvPr id="7" name="Oval 6">
+            <a:extLst>
+              <a:ext uri="{FF2B5EF4-FFF2-40B4-BE49-F238E27FC236}">
+                <a16:creationId xmlns:a16="http://schemas.microsoft.com/office/drawing/2014/main" id="{24D725F4-0C73-47E2-9717-FA3D5AEC3D24}"/>
+              </a:ext>
+            </a:extLst>
+          </p:cNvPr>
+          <p:cNvSpPr/>
+          <p:nvPr/>
+        </p:nvSpPr>
+        <p:spPr>
+          <a:xfrm>
+            <a:off x="3161271" y="3464922"/>
+            <a:ext cx="2314831" cy="873211"/>
+          </a:xfrm>
+          <a:prstGeom prst="ellipse">
+            <a:avLst/>
+          </a:prstGeom>
+        </p:spPr>
+        <p:style>
+          <a:lnRef idx="2">
+            <a:schemeClr val="accent1">
+              <a:shade val="50000"/>
+            </a:schemeClr>
+          </a:lnRef>
+          <a:fillRef idx="1">
+            <a:schemeClr val="accent1"/>
+          </a:fillRef>
+          <a:effectRef idx="0">
+            <a:schemeClr val="accent1"/>
+          </a:effectRef>
+          <a:fontRef idx="minor">
+            <a:schemeClr val="lt1"/>
+          </a:fontRef>
+        </p:style>
+        <p:txBody>
+          <a:bodyPr rtlCol="0" anchor="ctr"/>
+          <a:lstStyle/>
+          <a:p>
+            <a:pPr algn="ctr"/>
+            <a:r>
+              <a:rPr lang="en-US" sz="1600" dirty="0" err="1"/>
+              <a:t>LateForMeeting</a:t>
+            </a:r>
+            <a:endParaRPr lang="en-US" sz="1600" dirty="0"/>
+          </a:p>
+        </p:txBody>
+      </p:sp>
+      <p:sp>
+        <p:nvSpPr>
+          <p:cNvPr id="8" name="Oval 7">
+            <a:extLst>
+              <a:ext uri="{FF2B5EF4-FFF2-40B4-BE49-F238E27FC236}">
+                <a16:creationId xmlns:a16="http://schemas.microsoft.com/office/drawing/2014/main" id="{5163ACC1-13A7-4C20-9BF9-3982D7C5F03B}"/>
+              </a:ext>
+            </a:extLst>
+          </p:cNvPr>
+          <p:cNvSpPr/>
+          <p:nvPr/>
+        </p:nvSpPr>
+        <p:spPr>
+          <a:xfrm>
+            <a:off x="3323968" y="562065"/>
+            <a:ext cx="1837038" cy="873211"/>
+          </a:xfrm>
+          <a:prstGeom prst="ellipse">
+            <a:avLst/>
+          </a:prstGeom>
+        </p:spPr>
+        <p:style>
+          <a:lnRef idx="2">
+            <a:schemeClr val="accent1">
+              <a:shade val="50000"/>
+            </a:schemeClr>
+          </a:lnRef>
+          <a:fillRef idx="1">
+            <a:schemeClr val="accent1"/>
+          </a:fillRef>
+          <a:effectRef idx="0">
+            <a:schemeClr val="accent1"/>
+          </a:effectRef>
+          <a:fontRef idx="minor">
+            <a:schemeClr val="lt1"/>
+          </a:fontRef>
+        </p:style>
+        <p:txBody>
+          <a:bodyPr rtlCol="0" anchor="ctr"/>
+          <a:lstStyle/>
+          <a:p>
+            <a:pPr algn="ctr"/>
+            <a:r>
+              <a:rPr lang="en-US" dirty="0"/>
+              <a:t>Accident</a:t>
+            </a:r>
+          </a:p>
+        </p:txBody>
+      </p:sp>
+      <p:sp>
+        <p:nvSpPr>
+          <p:cNvPr id="10" name="Oval 9">
+            <a:extLst>
+              <a:ext uri="{FF2B5EF4-FFF2-40B4-BE49-F238E27FC236}">
+                <a16:creationId xmlns:a16="http://schemas.microsoft.com/office/drawing/2014/main" id="{9EE9FA1F-AB5F-491F-99A4-B904F2431A91}"/>
+              </a:ext>
+            </a:extLst>
+          </p:cNvPr>
+          <p:cNvSpPr/>
+          <p:nvPr/>
+        </p:nvSpPr>
+        <p:spPr>
+          <a:xfrm>
+            <a:off x="5542520" y="723505"/>
+            <a:ext cx="1837038" cy="873211"/>
+          </a:xfrm>
+          <a:prstGeom prst="ellipse">
+            <a:avLst/>
+          </a:prstGeom>
+        </p:spPr>
+        <p:style>
+          <a:lnRef idx="2">
+            <a:schemeClr val="accent1">
+              <a:shade val="50000"/>
+            </a:schemeClr>
+          </a:lnRef>
+          <a:fillRef idx="1">
+            <a:schemeClr val="accent1"/>
+          </a:fillRef>
+          <a:effectRef idx="0">
+            <a:schemeClr val="accent1"/>
+          </a:effectRef>
+          <a:fontRef idx="minor">
+            <a:schemeClr val="lt1"/>
+          </a:fontRef>
+        </p:style>
+        <p:txBody>
+          <a:bodyPr rtlCol="0" anchor="ctr"/>
+          <a:lstStyle/>
+          <a:p>
+            <a:pPr algn="ctr"/>
+            <a:r>
+              <a:rPr lang="en-US" dirty="0"/>
+              <a:t>Rain</a:t>
+            </a:r>
+          </a:p>
+        </p:txBody>
+      </p:sp>
+      <p:sp>
+        <p:nvSpPr>
+          <p:cNvPr id="11" name="Oval 10">
+            <a:extLst>
+              <a:ext uri="{FF2B5EF4-FFF2-40B4-BE49-F238E27FC236}">
+                <a16:creationId xmlns:a16="http://schemas.microsoft.com/office/drawing/2014/main" id="{DF430F81-2560-4EA8-B0A0-5AE233E8261B}"/>
+              </a:ext>
+            </a:extLst>
+          </p:cNvPr>
+          <p:cNvSpPr/>
+          <p:nvPr/>
+        </p:nvSpPr>
+        <p:spPr>
+          <a:xfrm>
+            <a:off x="4439166" y="1758156"/>
+            <a:ext cx="1837038" cy="873211"/>
+          </a:xfrm>
+          <a:prstGeom prst="ellipse">
+            <a:avLst/>
+          </a:prstGeom>
+        </p:spPr>
+        <p:style>
+          <a:lnRef idx="2">
+            <a:schemeClr val="accent1">
+              <a:shade val="50000"/>
+            </a:schemeClr>
+          </a:lnRef>
+          <a:fillRef idx="1">
+            <a:schemeClr val="accent1"/>
+          </a:fillRef>
+          <a:effectRef idx="0">
+            <a:schemeClr val="accent1"/>
+          </a:effectRef>
+          <a:fontRef idx="minor">
+            <a:schemeClr val="lt1"/>
+          </a:fontRef>
+        </p:style>
+        <p:txBody>
+          <a:bodyPr rtlCol="0" anchor="ctr"/>
+          <a:lstStyle/>
+          <a:p>
+            <a:pPr algn="ctr"/>
+            <a:r>
+              <a:rPr lang="en-US" dirty="0"/>
+              <a:t>Traffic</a:t>
+            </a:r>
+          </a:p>
+        </p:txBody>
+      </p:sp>
+      <p:sp>
+        <p:nvSpPr>
+          <p:cNvPr id="12" name="Oval 11">
+            <a:extLst>
+              <a:ext uri="{FF2B5EF4-FFF2-40B4-BE49-F238E27FC236}">
+                <a16:creationId xmlns:a16="http://schemas.microsoft.com/office/drawing/2014/main" id="{127835D1-0DE8-4CFA-9E99-C8E763AACF36}"/>
+              </a:ext>
+            </a:extLst>
+          </p:cNvPr>
+          <p:cNvSpPr/>
+          <p:nvPr/>
+        </p:nvSpPr>
+        <p:spPr>
+          <a:xfrm>
+            <a:off x="2242752" y="2364259"/>
+            <a:ext cx="1837038" cy="873211"/>
+          </a:xfrm>
+          <a:prstGeom prst="ellipse">
+            <a:avLst/>
+          </a:prstGeom>
+        </p:spPr>
+        <p:style>
+          <a:lnRef idx="2">
+            <a:schemeClr val="accent1">
+              <a:shade val="50000"/>
+            </a:schemeClr>
+          </a:lnRef>
+          <a:fillRef idx="1">
+            <a:schemeClr val="accent1"/>
+          </a:fillRef>
+          <a:effectRef idx="0">
+            <a:schemeClr val="accent1"/>
+          </a:effectRef>
+          <a:fontRef idx="minor">
+            <a:schemeClr val="lt1"/>
+          </a:fontRef>
+        </p:style>
+        <p:txBody>
+          <a:bodyPr rtlCol="0" anchor="ctr"/>
+          <a:lstStyle/>
+          <a:p>
+            <a:pPr algn="ctr"/>
+            <a:r>
+              <a:rPr lang="en-US" sz="1600" dirty="0" err="1"/>
+              <a:t>LateForWork</a:t>
+            </a:r>
+            <a:endParaRPr lang="en-US" sz="1600" dirty="0"/>
+          </a:p>
+        </p:txBody>
+      </p:sp>
+      <p:cxnSp>
+        <p:nvCxnSpPr>
+          <p:cNvPr id="14" name="Straight Arrow Connector 13">
+            <a:extLst>
+              <a:ext uri="{FF2B5EF4-FFF2-40B4-BE49-F238E27FC236}">
+                <a16:creationId xmlns:a16="http://schemas.microsoft.com/office/drawing/2014/main" id="{C93DBD31-BE47-4F7E-9506-08DD1D9D1C2A}"/>
+              </a:ext>
+            </a:extLst>
+          </p:cNvPr>
+          <p:cNvCxnSpPr>
+            <a:stCxn id="8" idx="4"/>
+            <a:endCxn id="11" idx="1"/>
+          </p:cNvCxnSpPr>
+          <p:nvPr/>
+        </p:nvCxnSpPr>
+        <p:spPr>
+          <a:xfrm>
+            <a:off x="4242487" y="1435276"/>
+            <a:ext cx="465707" cy="450759"/>
+          </a:xfrm>
+          <a:prstGeom prst="straightConnector1">
+            <a:avLst/>
+          </a:prstGeom>
+          <a:ln>
+            <a:tailEnd type="triangle"/>
+          </a:ln>
+        </p:spPr>
+        <p:style>
+          <a:lnRef idx="1">
+            <a:schemeClr val="accent1"/>
+          </a:lnRef>
+          <a:fillRef idx="0">
+            <a:schemeClr val="accent1"/>
+          </a:fillRef>
+          <a:effectRef idx="0">
+            <a:schemeClr val="accent1"/>
+          </a:effectRef>
+          <a:fontRef idx="minor">
+            <a:schemeClr val="tx1"/>
+          </a:fontRef>
+        </p:style>
+      </p:cxnSp>
+      <p:cxnSp>
+        <p:nvCxnSpPr>
+          <p:cNvPr id="15" name="Straight Arrow Connector 14">
+            <a:extLst>
+              <a:ext uri="{FF2B5EF4-FFF2-40B4-BE49-F238E27FC236}">
+                <a16:creationId xmlns:a16="http://schemas.microsoft.com/office/drawing/2014/main" id="{3511CD50-1E68-4E7F-A40E-9FC9A1D9D39A}"/>
+              </a:ext>
+            </a:extLst>
+          </p:cNvPr>
+          <p:cNvCxnSpPr>
+            <a:cxnSpLocks/>
+            <a:stCxn id="10" idx="4"/>
+            <a:endCxn id="11" idx="7"/>
+          </p:cNvCxnSpPr>
+          <p:nvPr/>
+        </p:nvCxnSpPr>
+        <p:spPr>
+          <a:xfrm flipH="1">
+            <a:off x="6007176" y="1596716"/>
+            <a:ext cx="453863" cy="289319"/>
+          </a:xfrm>
+          <a:prstGeom prst="straightConnector1">
+            <a:avLst/>
+          </a:prstGeom>
+          <a:ln>
+            <a:tailEnd type="triangle"/>
+          </a:ln>
+        </p:spPr>
+        <p:style>
+          <a:lnRef idx="1">
+            <a:schemeClr val="accent1"/>
+          </a:lnRef>
+          <a:fillRef idx="0">
+            <a:schemeClr val="accent1"/>
+          </a:fillRef>
+          <a:effectRef idx="0">
+            <a:schemeClr val="accent1"/>
+          </a:effectRef>
+          <a:fontRef idx="minor">
+            <a:schemeClr val="tx1"/>
+          </a:fontRef>
+        </p:style>
+      </p:cxnSp>
+      <p:cxnSp>
+        <p:nvCxnSpPr>
+          <p:cNvPr id="18" name="Straight Arrow Connector 17">
+            <a:extLst>
+              <a:ext uri="{FF2B5EF4-FFF2-40B4-BE49-F238E27FC236}">
+                <a16:creationId xmlns:a16="http://schemas.microsoft.com/office/drawing/2014/main" id="{395F9601-370C-47AA-9B03-6061DA5B58C0}"/>
+              </a:ext>
+            </a:extLst>
+          </p:cNvPr>
+          <p:cNvCxnSpPr>
+            <a:cxnSpLocks/>
+            <a:stCxn id="11" idx="2"/>
+            <a:endCxn id="12" idx="6"/>
+          </p:cNvCxnSpPr>
+          <p:nvPr/>
+        </p:nvCxnSpPr>
+        <p:spPr>
+          <a:xfrm flipH="1">
+            <a:off x="4079790" y="2194762"/>
+            <a:ext cx="359376" cy="606103"/>
+          </a:xfrm>
+          <a:prstGeom prst="straightConnector1">
+            <a:avLst/>
+          </a:prstGeom>
+          <a:ln>
+            <a:tailEnd type="triangle"/>
+          </a:ln>
+        </p:spPr>
+        <p:style>
+          <a:lnRef idx="1">
+            <a:schemeClr val="accent1"/>
+          </a:lnRef>
+          <a:fillRef idx="0">
+            <a:schemeClr val="accent1"/>
+          </a:fillRef>
+          <a:effectRef idx="0">
+            <a:schemeClr val="accent1"/>
+          </a:effectRef>
+          <a:fontRef idx="minor">
+            <a:schemeClr val="tx1"/>
+          </a:fontRef>
+        </p:style>
+      </p:cxnSp>
+      <p:cxnSp>
+        <p:nvCxnSpPr>
+          <p:cNvPr id="21" name="Straight Arrow Connector 20">
+            <a:extLst>
+              <a:ext uri="{FF2B5EF4-FFF2-40B4-BE49-F238E27FC236}">
+                <a16:creationId xmlns:a16="http://schemas.microsoft.com/office/drawing/2014/main" id="{4A04CA49-04C1-4DEA-ACF8-D6334D9304E1}"/>
+              </a:ext>
+            </a:extLst>
+          </p:cNvPr>
+          <p:cNvCxnSpPr>
+            <a:cxnSpLocks/>
+            <a:stCxn id="4" idx="4"/>
+            <a:endCxn id="12" idx="0"/>
+          </p:cNvCxnSpPr>
+          <p:nvPr/>
+        </p:nvCxnSpPr>
+        <p:spPr>
+          <a:xfrm>
+            <a:off x="2242752" y="1758156"/>
+            <a:ext cx="918519" cy="606103"/>
+          </a:xfrm>
+          <a:prstGeom prst="straightConnector1">
+            <a:avLst/>
+          </a:prstGeom>
+          <a:ln>
+            <a:tailEnd type="triangle"/>
+          </a:ln>
+        </p:spPr>
+        <p:style>
+          <a:lnRef idx="1">
+            <a:schemeClr val="accent1"/>
+          </a:lnRef>
+          <a:fillRef idx="0">
+            <a:schemeClr val="accent1"/>
+          </a:fillRef>
+          <a:effectRef idx="0">
+            <a:schemeClr val="accent1"/>
+          </a:effectRef>
+          <a:fontRef idx="minor">
+            <a:schemeClr val="tx1"/>
+          </a:fontRef>
+        </p:style>
+      </p:cxnSp>
+      <p:cxnSp>
+        <p:nvCxnSpPr>
+          <p:cNvPr id="24" name="Straight Arrow Connector 23">
+            <a:extLst>
+              <a:ext uri="{FF2B5EF4-FFF2-40B4-BE49-F238E27FC236}">
+                <a16:creationId xmlns:a16="http://schemas.microsoft.com/office/drawing/2014/main" id="{84126671-81B4-4E32-B73C-64FF8B1F75E9}"/>
+              </a:ext>
+            </a:extLst>
+          </p:cNvPr>
+          <p:cNvCxnSpPr>
+            <a:cxnSpLocks/>
+            <a:endCxn id="7" idx="1"/>
+          </p:cNvCxnSpPr>
+          <p:nvPr/>
+        </p:nvCxnSpPr>
+        <p:spPr>
+          <a:xfrm>
+            <a:off x="3323968" y="3237470"/>
+            <a:ext cx="176302" cy="355331"/>
+          </a:xfrm>
+          <a:prstGeom prst="straightConnector1">
+            <a:avLst/>
+          </a:prstGeom>
+          <a:ln>
+            <a:tailEnd type="triangle"/>
+          </a:ln>
+        </p:spPr>
+        <p:style>
+          <a:lnRef idx="1">
+            <a:schemeClr val="accent1"/>
+          </a:lnRef>
+          <a:fillRef idx="0">
+            <a:schemeClr val="accent1"/>
+          </a:fillRef>
+          <a:effectRef idx="0">
+            <a:schemeClr val="accent1"/>
+          </a:effectRef>
+          <a:fontRef idx="minor">
+            <a:schemeClr val="tx1"/>
+          </a:fontRef>
+        </p:style>
+      </p:cxnSp>
+    </p:spTree>
+    <p:extLst>
+      <p:ext uri="{BB962C8B-B14F-4D97-AF65-F5344CB8AC3E}">
+        <p14:creationId xmlns:p14="http://schemas.microsoft.com/office/powerpoint/2010/main" val="2242253680"/>
+      </p:ext>
+    </p:extLst>
+  </p:cSld>
+  <p:clrMapOvr>
+    <a:masterClrMapping/>
+  </p:clrMapOvr>
+</p:sld>
+</file>
+
 <file path=ppt/theme/theme1.xml><?xml version="1.0" encoding="utf-8"?>
 <a:theme xmlns:a="http://schemas.openxmlformats.org/drawingml/2006/main" name="Office Theme">
   <a:themeElements>

</xml_diff>